<commit_message>
minor modifications to several slides
</commit_message>
<xml_diff>
--- a/PowerPoints/04 - Definition of CPRL.pptx
+++ b/PowerPoints/04 - Definition of CPRL.pptx
@@ -5399,17 +5399,8 @@
               <a:rPr lang="en-US" sz="1800" dirty="0">
                 <a:latin typeface="Consolas" panose="020B0609020204030204" pitchFamily="49" charset="0"/>
               </a:rPr>
-              <a:t>name := "Caleb";      // length </a:t>
-            </a:r>
-            <a:r>
-              <a:rPr lang="en-US" sz="1800">
-                <a:latin typeface="Consolas" panose="020B0609020204030204" pitchFamily="49" charset="0"/>
-              </a:rPr>
-              <a:t>= 5</a:t>
-            </a:r>
-            <a:endParaRPr lang="en-US" sz="1800" dirty="0">
-              <a:latin typeface="Consolas" panose="020B0609020204030204" pitchFamily="49" charset="0"/>
-            </a:endParaRPr>
+              <a:t>name := "Caleb";      // length = 5</a:t>
+            </a:r>
           </a:p>
           <a:p>
             <a:endParaRPr lang="en-US" dirty="0"/>
@@ -5570,7 +5561,7 @@
           <a:p>
             <a:r>
               <a:rPr lang="en-US" dirty="0"/>
-              <a:t>Small but complete programming language with constructs similar to those found in Ada, Java, C++, and Kotlin.</a:t>
+              <a:t>Small but complete programming language with constructs similar to those found in Ada and C-based languages such as Java, Kotlin, and C#.</a:t>
             </a:r>
           </a:p>
           <a:p>
@@ -8962,7 +8953,7 @@
               <a:rPr lang="en-US" dirty="0">
                 <a:latin typeface="Consolas" panose="020B0609020204030204" pitchFamily="49" charset="0"/>
               </a:rPr>
-              <a:t>identifier = letter ( letter | digit )* .</a:t>
+              <a:t>identifier = letter { letter | digit } .</a:t>
             </a:r>
           </a:p>
           <a:p>
@@ -10136,7 +10127,7 @@
             <a:pPr lvl="1"/>
             <a:r>
               <a:rPr lang="en-US" dirty="0"/>
-              <a:t>Examples include variable declarations, type declarations, and subprogram declarations.</a:t>
+              <a:t>Examples include constant declarations, variable declarations, type declarations, and subprogram declarations.</a:t>
             </a:r>
           </a:p>
           <a:p>

</xml_diff>

<commit_message>
minor edit to one PowerPoint slide
</commit_message>
<xml_diff>
--- a/PowerPoints/04 - Definition of CPRL.pptx
+++ b/PowerPoints/04 - Definition of CPRL.pptx
@@ -9964,10 +9964,16 @@
               <a:buNone/>
             </a:pPr>
             <a:r>
+              <a:rPr lang="en-US" sz="2000">
+                <a:latin typeface="Consolas" panose="020B0609020204030204" pitchFamily="49" charset="0"/>
+              </a:rPr>
+              <a:t>EOF</a:t>
+            </a:r>
+            <a:r>
               <a:rPr lang="en-US" sz="2000" dirty="0">
                 <a:latin typeface="Consolas" panose="020B0609020204030204" pitchFamily="49" charset="0"/>
               </a:rPr>
-              <a:t>comment, EOF, unknown</a:t>
+              <a:t>, unknown</a:t>
             </a:r>
           </a:p>
           <a:p>

</xml_diff>

<commit_message>
minor improvements to a couple of slides
</commit_message>
<xml_diff>
--- a/PowerPoints/04 - Definition of CPRL.pptx
+++ b/PowerPoints/04 - Definition of CPRL.pptx
@@ -5712,17 +5712,25 @@
           <a:p>
             <a:r>
               <a:rPr lang="en-US" dirty="0"/>
-              <a:t>A sequence of zero or more statements enclosed in braces “</a:t>
-            </a:r>
-            <a:r>
-              <a:rPr lang="en-US" dirty="0">
+              <a:t>A sequence of zero or more statements enclosed in </a:t>
+            </a:r>
+            <a:r>
+              <a:rPr lang="en-US"/>
+              <a:t>braces “</a:t>
+            </a:r>
+            <a:r>
+              <a:rPr lang="en-US">
                 <a:latin typeface="Consolas" panose="020B0609020204030204" pitchFamily="49" charset="0"/>
               </a:rPr>
               <a:t>{</a:t>
             </a:r>
             <a:r>
-              <a:rPr lang="en-US" dirty="0"/>
-              <a:t>“ and “</a:t>
+              <a:rPr lang="en-US"/>
+              <a:t>” </a:t>
+            </a:r>
+            <a:r>
+              <a:rPr lang="en-US" dirty="0"/>
+              <a:t>and “</a:t>
             </a:r>
             <a:r>
               <a:rPr lang="en-US" dirty="0">
@@ -7456,40 +7464,40 @@
               <a:buNone/>
             </a:pPr>
             <a:r>
-              <a:rPr lang="en-US" sz="1850" dirty="0" err="1">
+              <a:rPr lang="en-US" sz="1750" dirty="0" err="1">
                 <a:latin typeface="Consolas" panose="020B0609020204030204" pitchFamily="49" charset="0"/>
               </a:rPr>
               <a:t>procedureCallStmt</a:t>
             </a:r>
             <a:r>
-              <a:rPr lang="en-US" sz="1850" dirty="0">
+              <a:rPr lang="en-US" sz="1750" dirty="0">
                 <a:latin typeface="Consolas" panose="020B0609020204030204" pitchFamily="49" charset="0"/>
               </a:rPr>
               <a:t> = </a:t>
             </a:r>
             <a:r>
-              <a:rPr lang="en-US" sz="1850" dirty="0" err="1">
+              <a:rPr lang="en-US" sz="1750" dirty="0" err="1">
                 <a:latin typeface="Consolas" panose="020B0609020204030204" pitchFamily="49" charset="0"/>
               </a:rPr>
               <a:t>procId</a:t>
             </a:r>
             <a:r>
-              <a:rPr lang="en-US" sz="1850" dirty="0">
+              <a:rPr lang="en-US" sz="1750" dirty="0">
                 <a:latin typeface="Consolas" panose="020B0609020204030204" pitchFamily="49" charset="0"/>
               </a:rPr>
               <a:t> "(" [ </a:t>
             </a:r>
             <a:r>
-              <a:rPr lang="en-US" sz="1850" dirty="0" err="1">
+              <a:rPr lang="en-US" sz="1750" dirty="0" err="1">
                 <a:latin typeface="Consolas" panose="020B0609020204030204" pitchFamily="49" charset="0"/>
               </a:rPr>
               <a:t>actualParameters</a:t>
             </a:r>
             <a:r>
-              <a:rPr lang="en-US" sz="1850" dirty="0">
-                <a:latin typeface="Consolas" panose="020B0609020204030204" pitchFamily="49" charset="0"/>
-              </a:rPr>
-              <a:t> ] ")"</a:t>
+              <a:rPr lang="en-US" sz="1750" dirty="0">
+                <a:latin typeface="Consolas" panose="020B0609020204030204" pitchFamily="49" charset="0"/>
+              </a:rPr>
+              <a:t> ] ")" ";" .</a:t>
             </a:r>
           </a:p>
           <a:p>
@@ -7497,24 +7505,13 @@
               <a:buNone/>
             </a:pPr>
             <a:r>
-              <a:rPr lang="en-US" sz="1850" dirty="0">
-                <a:latin typeface="Consolas" panose="020B0609020204030204" pitchFamily="49" charset="0"/>
-              </a:rPr>
-              <a:t>                    ";" .</a:t>
-            </a:r>
-          </a:p>
-          <a:p>
-            <a:pPr marL="457200" lvl="1" indent="0">
-              <a:buNone/>
-            </a:pPr>
-            <a:r>
-              <a:rPr lang="en-US" sz="1850" dirty="0" err="1">
+              <a:rPr lang="en-US" sz="1750" dirty="0" err="1">
                 <a:latin typeface="Consolas" panose="020B0609020204030204" pitchFamily="49" charset="0"/>
               </a:rPr>
               <a:t>actualParameters</a:t>
             </a:r>
             <a:r>
-              <a:rPr lang="en-US" sz="1850" dirty="0">
+              <a:rPr lang="en-US" sz="1750" dirty="0">
                 <a:latin typeface="Consolas" panose="020B0609020204030204" pitchFamily="49" charset="0"/>
               </a:rPr>
               <a:t> = expression { "," expression } .</a:t>

</xml_diff>